<commit_message>
Updated module 4 and completed
</commit_message>
<xml_diff>
--- a/Module_4/presentations/module_4_presentation.pptx
+++ b/Module_4/presentations/module_4_presentation.pptx
@@ -5,7 +5,7 @@
     <p:sldMasterId id="2147483655" r:id="rId1"/>
   </p:sldMasterIdLst>
   <p:notesMasterIdLst>
-    <p:notesMasterId r:id="rId39"/>
+    <p:notesMasterId r:id="rId43"/>
   </p:notesMasterIdLst>
   <p:sldIdLst>
     <p:sldId id="256" r:id="rId2"/>
@@ -44,7 +44,11 @@
     <p:sldId id="520" r:id="rId35"/>
     <p:sldId id="521" r:id="rId36"/>
     <p:sldId id="522" r:id="rId37"/>
-    <p:sldId id="489" r:id="rId38"/>
+    <p:sldId id="523" r:id="rId38"/>
+    <p:sldId id="524" r:id="rId39"/>
+    <p:sldId id="525" r:id="rId40"/>
+    <p:sldId id="526" r:id="rId41"/>
+    <p:sldId id="489" r:id="rId42"/>
   </p:sldIdLst>
   <p:sldSz cx="9144000" cy="6858000" type="screen4x3"/>
   <p:notesSz cx="6858000" cy="9144000"/>
@@ -1698,7 +1702,7 @@
             </a:pPr>
             <a:fld id="{00000000-1234-1234-1234-123412341234}" type="slidenum">
               <a:rPr lang="en-US"/>
-              <a:t>37</a:t>
+              <a:t>41</a:t>
             </a:fld>
             <a:endParaRPr lang="en-US"/>
           </a:p>
@@ -11883,10 +11887,96 @@
           <a:bodyPr/>
           <a:lstStyle/>
           <a:p>
-            <a:endParaRPr lang="en-US"/>
+            <a:r>
+              <a:rPr lang="en-US" dirty="0"/>
+              <a:t> So imagine we have a webserver that handles incoming requests and writes data to a database. </a:t>
+            </a:r>
+          </a:p>
+          <a:p>
+            <a:r>
+              <a:rPr lang="en-US" dirty="0"/>
+              <a:t> Now let’s suppose that our writes to our (one has to assume </a:t>
+            </a:r>
+            <a:r>
+              <a:rPr lang="en-US" i="1" dirty="0"/>
+              <a:t>legacy</a:t>
+            </a:r>
+            <a:r>
+              <a:rPr lang="en-US" dirty="0"/>
+              <a:t>) database are struggling to keep up with the incoming data. </a:t>
+            </a:r>
+          </a:p>
+          <a:p>
+            <a:r>
+              <a:rPr lang="en-US" dirty="0"/>
+              <a:t> SO- now we want to slow down our incoming data </a:t>
+            </a:r>
+            <a:r>
+              <a:rPr lang="en-US" dirty="0" err="1"/>
+              <a:t>utililizing</a:t>
+            </a:r>
+            <a:r>
+              <a:rPr lang="en-US" dirty="0"/>
+              <a:t> a </a:t>
+            </a:r>
+            <a:r>
+              <a:rPr lang="en-US" b="1" dirty="0"/>
+              <a:t>rate limiter</a:t>
+            </a:r>
+            <a:r>
+              <a:rPr lang="en-US" dirty="0"/>
+              <a:t>. </a:t>
+            </a:r>
           </a:p>
         </p:txBody>
       </p:sp>
+      <p:pic>
+        <p:nvPicPr>
+          <p:cNvPr id="1026" name="Picture 2" descr="Image result for golang gopher">
+            <a:extLst>
+              <a:ext uri="{FF2B5EF4-FFF2-40B4-BE49-F238E27FC236}">
+                <a16:creationId xmlns:a16="http://schemas.microsoft.com/office/drawing/2014/main" id="{2CEC09C3-CDC6-6A45-99F9-12C0B422FA89}"/>
+              </a:ext>
+            </a:extLst>
+          </p:cNvPr>
+          <p:cNvPicPr>
+            <a:picLocks noChangeAspect="1" noChangeArrowheads="1"/>
+          </p:cNvPicPr>
+          <p:nvPr/>
+        </p:nvPicPr>
+        <p:blipFill>
+          <a:blip r:embed="rId2">
+            <a:extLst>
+              <a:ext uri="{28A0092B-C50C-407E-A947-70E740481C1C}">
+                <a14:useLocalDpi xmlns:a14="http://schemas.microsoft.com/office/drawing/2010/main" val="0"/>
+              </a:ext>
+            </a:extLst>
+          </a:blip>
+          <a:srcRect/>
+          <a:stretch>
+            <a:fillRect/>
+          </a:stretch>
+        </p:blipFill>
+        <p:spPr bwMode="auto">
+          <a:xfrm>
+            <a:off x="4055882" y="4637987"/>
+            <a:ext cx="1944867" cy="1944867"/>
+          </a:xfrm>
+          <a:prstGeom prst="rect">
+            <a:avLst/>
+          </a:prstGeom>
+          <a:noFill/>
+          <a:extLst>
+            <a:ext uri="{909E8E84-426E-40DD-AFC4-6F175D3DCCD1}">
+              <a14:hiddenFill xmlns:a14="http://schemas.microsoft.com/office/drawing/2010/main">
+                <a:solidFill>
+                  <a:srgbClr val="FFFFFF"/>
+                </a:solidFill>
+              </a14:hiddenFill>
+            </a:ext>
+          </a:extLst>
+        </p:spPr>
+      </p:pic>
     </p:spTree>
     <p:extLst>
       <p:ext uri="{BB962C8B-B14F-4D97-AF65-F5344CB8AC3E}">
@@ -11901,6 +11991,835 @@
 </file>
 
 <file path=ppt/slides/slide37.xml><?xml version="1.0" encoding="utf-8"?>
+<p:sld xmlns:a="http://schemas.openxmlformats.org/drawingml/2006/main" xmlns:r="http://schemas.openxmlformats.org/officeDocument/2006/relationships" xmlns:p="http://schemas.openxmlformats.org/presentationml/2006/main">
+  <p:cSld>
+    <p:spTree>
+      <p:nvGrpSpPr>
+        <p:cNvPr id="1" name=""/>
+        <p:cNvGrpSpPr/>
+        <p:nvPr/>
+      </p:nvGrpSpPr>
+      <p:grpSpPr>
+        <a:xfrm>
+          <a:off x="0" y="0"/>
+          <a:ext cx="0" cy="0"/>
+          <a:chOff x="0" y="0"/>
+          <a:chExt cx="0" cy="0"/>
+        </a:xfrm>
+      </p:grpSpPr>
+      <p:sp>
+        <p:nvSpPr>
+          <p:cNvPr id="2" name="Title 1">
+            <a:extLst>
+              <a:ext uri="{FF2B5EF4-FFF2-40B4-BE49-F238E27FC236}">
+                <a16:creationId xmlns:a16="http://schemas.microsoft.com/office/drawing/2014/main" id="{F104F672-DF5C-224B-BC24-7BF14F63F916}"/>
+              </a:ext>
+            </a:extLst>
+          </p:cNvPr>
+          <p:cNvSpPr>
+            <a:spLocks noGrp="1"/>
+          </p:cNvSpPr>
+          <p:nvPr>
+            <p:ph type="title"/>
+          </p:nvPr>
+        </p:nvSpPr>
+        <p:spPr/>
+        <p:txBody>
+          <a:bodyPr/>
+          <a:lstStyle/>
+          <a:p>
+            <a:r>
+              <a:rPr lang="en-US" dirty="0"/>
+              <a:t>How to create rate limiters for channels</a:t>
+            </a:r>
+          </a:p>
+        </p:txBody>
+      </p:sp>
+      <p:sp>
+        <p:nvSpPr>
+          <p:cNvPr id="3" name="Text Placeholder 2">
+            <a:extLst>
+              <a:ext uri="{FF2B5EF4-FFF2-40B4-BE49-F238E27FC236}">
+                <a16:creationId xmlns:a16="http://schemas.microsoft.com/office/drawing/2014/main" id="{96450284-6CE6-CB43-96CB-493361CF1DE2}"/>
+              </a:ext>
+            </a:extLst>
+          </p:cNvPr>
+          <p:cNvSpPr>
+            <a:spLocks noGrp="1"/>
+          </p:cNvSpPr>
+          <p:nvPr>
+            <p:ph type="body" idx="1"/>
+          </p:nvPr>
+        </p:nvSpPr>
+        <p:spPr/>
+        <p:txBody>
+          <a:bodyPr/>
+          <a:lstStyle/>
+          <a:p>
+            <a:r>
+              <a:rPr lang="en-US" dirty="0"/>
+              <a:t> So if we want to handle basic rate limiting we serve the requests off of a buffered channel. We can then use the </a:t>
+            </a:r>
+            <a:r>
+              <a:rPr lang="en-US" b="1" dirty="0" err="1"/>
+              <a:t>time.Tick</a:t>
+            </a:r>
+            <a:r>
+              <a:rPr lang="en-US" dirty="0"/>
+              <a:t> method (from the built in </a:t>
+            </a:r>
+            <a:r>
+              <a:rPr lang="en-US" b="1" dirty="0"/>
+              <a:t>time</a:t>
+            </a:r>
+            <a:r>
+              <a:rPr lang="en-US" dirty="0"/>
+              <a:t> package) to ensure that something only happens at the time of the tick.</a:t>
+            </a:r>
+          </a:p>
+          <a:p>
+            <a:r>
+              <a:rPr lang="en-US" dirty="0"/>
+              <a:t>So in the case of the lab- every 200 milliseconds we’re going to have a message written.</a:t>
+            </a:r>
+          </a:p>
+        </p:txBody>
+      </p:sp>
+      <p:pic>
+        <p:nvPicPr>
+          <p:cNvPr id="2050" name="Picture 2" descr="Image result for golang gopher">
+            <a:extLst>
+              <a:ext uri="{FF2B5EF4-FFF2-40B4-BE49-F238E27FC236}">
+                <a16:creationId xmlns:a16="http://schemas.microsoft.com/office/drawing/2014/main" id="{E7F64CE2-CCAB-294C-B347-6C85308A04E5}"/>
+              </a:ext>
+            </a:extLst>
+          </p:cNvPr>
+          <p:cNvPicPr>
+            <a:picLocks noChangeAspect="1" noChangeArrowheads="1"/>
+          </p:cNvPicPr>
+          <p:nvPr/>
+        </p:nvPicPr>
+        <p:blipFill>
+          <a:blip r:embed="rId2">
+            <a:extLst>
+              <a:ext uri="{28A0092B-C50C-407E-A947-70E740481C1C}">
+                <a14:useLocalDpi xmlns:a14="http://schemas.microsoft.com/office/drawing/2010/main" val="0"/>
+              </a:ext>
+            </a:extLst>
+          </a:blip>
+          <a:srcRect/>
+          <a:stretch>
+            <a:fillRect/>
+          </a:stretch>
+        </p:blipFill>
+        <p:spPr bwMode="auto">
+          <a:xfrm>
+            <a:off x="3280528" y="4539786"/>
+            <a:ext cx="3037722" cy="2021466"/>
+          </a:xfrm>
+          <a:prstGeom prst="rect">
+            <a:avLst/>
+          </a:prstGeom>
+          <a:noFill/>
+          <a:extLst>
+            <a:ext uri="{909E8E84-426E-40DD-AFC4-6F175D3DCCD1}">
+              <a14:hiddenFill xmlns:a14="http://schemas.microsoft.com/office/drawing/2010/main">
+                <a:solidFill>
+                  <a:srgbClr val="FFFFFF"/>
+                </a:solidFill>
+              </a14:hiddenFill>
+            </a:ext>
+          </a:extLst>
+        </p:spPr>
+      </p:pic>
+    </p:spTree>
+    <p:extLst>
+      <p:ext uri="{BB962C8B-B14F-4D97-AF65-F5344CB8AC3E}">
+        <p14:creationId xmlns:p14="http://schemas.microsoft.com/office/powerpoint/2010/main" val="860875101"/>
+      </p:ext>
+    </p:extLst>
+  </p:cSld>
+  <p:clrMapOvr>
+    <a:masterClrMapping/>
+  </p:clrMapOvr>
+</p:sld>
+</file>
+
+<file path=ppt/slides/slide38.xml><?xml version="1.0" encoding="utf-8"?>
+<p:sld xmlns:a="http://schemas.openxmlformats.org/drawingml/2006/main" xmlns:r="http://schemas.openxmlformats.org/officeDocument/2006/relationships" xmlns:p="http://schemas.openxmlformats.org/presentationml/2006/main">
+  <p:cSld>
+    <p:spTree>
+      <p:nvGrpSpPr>
+        <p:cNvPr id="1" name=""/>
+        <p:cNvGrpSpPr/>
+        <p:nvPr/>
+      </p:nvGrpSpPr>
+      <p:grpSpPr>
+        <a:xfrm>
+          <a:off x="0" y="0"/>
+          <a:ext cx="0" cy="0"/>
+          <a:chOff x="0" y="0"/>
+          <a:chExt cx="0" cy="0"/>
+        </a:xfrm>
+      </p:grpSpPr>
+      <p:sp>
+        <p:nvSpPr>
+          <p:cNvPr id="2" name="Title 1">
+            <a:extLst>
+              <a:ext uri="{FF2B5EF4-FFF2-40B4-BE49-F238E27FC236}">
+                <a16:creationId xmlns:a16="http://schemas.microsoft.com/office/drawing/2014/main" id="{B87E0180-B0EB-7F4E-B49C-445D1E289390}"/>
+              </a:ext>
+            </a:extLst>
+          </p:cNvPr>
+          <p:cNvSpPr>
+            <a:spLocks noGrp="1"/>
+          </p:cNvSpPr>
+          <p:nvPr>
+            <p:ph type="title"/>
+          </p:nvPr>
+        </p:nvSpPr>
+        <p:spPr/>
+        <p:txBody>
+          <a:bodyPr/>
+          <a:lstStyle/>
+          <a:p>
+            <a:r>
+              <a:rPr lang="en-US" dirty="0"/>
+              <a:t>Bursting data</a:t>
+            </a:r>
+          </a:p>
+        </p:txBody>
+      </p:sp>
+      <p:sp>
+        <p:nvSpPr>
+          <p:cNvPr id="3" name="Text Placeholder 2">
+            <a:extLst>
+              <a:ext uri="{FF2B5EF4-FFF2-40B4-BE49-F238E27FC236}">
+                <a16:creationId xmlns:a16="http://schemas.microsoft.com/office/drawing/2014/main" id="{F5E08751-C6D9-BD46-8202-A466720C70FF}"/>
+              </a:ext>
+            </a:extLst>
+          </p:cNvPr>
+          <p:cNvSpPr>
+            <a:spLocks noGrp="1"/>
+          </p:cNvSpPr>
+          <p:nvPr>
+            <p:ph type="body" idx="1"/>
+          </p:nvPr>
+        </p:nvSpPr>
+        <p:spPr/>
+        <p:txBody>
+          <a:bodyPr/>
+          <a:lstStyle/>
+          <a:p>
+            <a:r>
+              <a:rPr lang="en-US" dirty="0"/>
+              <a:t> Also as part of the lab we have a ”bursting” system that basically sets up the channel buffer to “burst” three “writes” to our database every 200 milliseconds. </a:t>
+            </a:r>
+          </a:p>
+          <a:p>
+            <a:r>
+              <a:rPr lang="en-US" dirty="0"/>
+              <a:t> A good system to set up is to check the concurrency of the database that you are writing to and line up your channel workers with that number.</a:t>
+            </a:r>
+          </a:p>
+        </p:txBody>
+      </p:sp>
+      <p:pic>
+        <p:nvPicPr>
+          <p:cNvPr id="3074" name="Picture 2" descr="Image result for golang gopher">
+            <a:extLst>
+              <a:ext uri="{FF2B5EF4-FFF2-40B4-BE49-F238E27FC236}">
+                <a16:creationId xmlns:a16="http://schemas.microsoft.com/office/drawing/2014/main" id="{D475D335-9E1B-8046-A080-D642BDE07A6F}"/>
+              </a:ext>
+            </a:extLst>
+          </p:cNvPr>
+          <p:cNvPicPr>
+            <a:picLocks noChangeAspect="1" noChangeArrowheads="1"/>
+          </p:cNvPicPr>
+          <p:nvPr/>
+        </p:nvPicPr>
+        <p:blipFill>
+          <a:blip r:embed="rId2">
+            <a:extLst>
+              <a:ext uri="{28A0092B-C50C-407E-A947-70E740481C1C}">
+                <a14:useLocalDpi xmlns:a14="http://schemas.microsoft.com/office/drawing/2010/main" val="0"/>
+              </a:ext>
+            </a:extLst>
+          </a:blip>
+          <a:srcRect/>
+          <a:stretch>
+            <a:fillRect/>
+          </a:stretch>
+        </p:blipFill>
+        <p:spPr bwMode="auto">
+          <a:xfrm>
+            <a:off x="3685880" y="4164290"/>
+            <a:ext cx="2314870" cy="2314870"/>
+          </a:xfrm>
+          <a:prstGeom prst="rect">
+            <a:avLst/>
+          </a:prstGeom>
+          <a:noFill/>
+          <a:extLst>
+            <a:ext uri="{909E8E84-426E-40DD-AFC4-6F175D3DCCD1}">
+              <a14:hiddenFill xmlns:a14="http://schemas.microsoft.com/office/drawing/2010/main">
+                <a:solidFill>
+                  <a:srgbClr val="FFFFFF"/>
+                </a:solidFill>
+              </a14:hiddenFill>
+            </a:ext>
+          </a:extLst>
+        </p:spPr>
+      </p:pic>
+    </p:spTree>
+    <p:extLst>
+      <p:ext uri="{BB962C8B-B14F-4D97-AF65-F5344CB8AC3E}">
+        <p14:creationId xmlns:p14="http://schemas.microsoft.com/office/powerpoint/2010/main" val="3717393469"/>
+      </p:ext>
+    </p:extLst>
+  </p:cSld>
+  <p:clrMapOvr>
+    <a:masterClrMapping/>
+  </p:clrMapOvr>
+</p:sld>
+</file>
+
+<file path=ppt/slides/slide39.xml><?xml version="1.0" encoding="utf-8"?>
+<p:sld xmlns:a="http://schemas.openxmlformats.org/drawingml/2006/main" xmlns:r="http://schemas.openxmlformats.org/officeDocument/2006/relationships" xmlns:p="http://schemas.openxmlformats.org/presentationml/2006/main">
+  <p:cSld>
+    <p:spTree>
+      <p:nvGrpSpPr>
+        <p:cNvPr id="1" name=""/>
+        <p:cNvGrpSpPr/>
+        <p:nvPr/>
+      </p:nvGrpSpPr>
+      <p:grpSpPr>
+        <a:xfrm>
+          <a:off x="0" y="0"/>
+          <a:ext cx="0" cy="0"/>
+          <a:chOff x="0" y="0"/>
+          <a:chExt cx="0" cy="0"/>
+        </a:xfrm>
+      </p:grpSpPr>
+      <p:sp>
+        <p:nvSpPr>
+          <p:cNvPr id="2" name="Title 1">
+            <a:extLst>
+              <a:ext uri="{FF2B5EF4-FFF2-40B4-BE49-F238E27FC236}">
+                <a16:creationId xmlns:a16="http://schemas.microsoft.com/office/drawing/2014/main" id="{C295AF79-776A-4247-8BD6-187BF8BBB8B5}"/>
+              </a:ext>
+            </a:extLst>
+          </p:cNvPr>
+          <p:cNvSpPr>
+            <a:spLocks noGrp="1"/>
+          </p:cNvSpPr>
+          <p:nvPr>
+            <p:ph type="title"/>
+          </p:nvPr>
+        </p:nvSpPr>
+        <p:spPr/>
+        <p:txBody>
+          <a:bodyPr/>
+          <a:lstStyle/>
+          <a:p>
+            <a:r>
+              <a:rPr lang="en-US" dirty="0"/>
+              <a:t>Atomics vs Mutexes</a:t>
+            </a:r>
+          </a:p>
+        </p:txBody>
+      </p:sp>
+      <p:sp>
+        <p:nvSpPr>
+          <p:cNvPr id="3" name="Text Placeholder 2">
+            <a:extLst>
+              <a:ext uri="{FF2B5EF4-FFF2-40B4-BE49-F238E27FC236}">
+                <a16:creationId xmlns:a16="http://schemas.microsoft.com/office/drawing/2014/main" id="{241913A2-998D-364A-BFB7-044CEDA6576C}"/>
+              </a:ext>
+            </a:extLst>
+          </p:cNvPr>
+          <p:cNvSpPr>
+            <a:spLocks noGrp="1"/>
+          </p:cNvSpPr>
+          <p:nvPr>
+            <p:ph type="body" idx="1"/>
+          </p:nvPr>
+        </p:nvSpPr>
+        <p:spPr/>
+        <p:txBody>
+          <a:bodyPr/>
+          <a:lstStyle/>
+          <a:p>
+            <a:r>
+              <a:rPr lang="en-US" dirty="0"/>
+              <a:t> So we’re going to go to another example of an auto-</a:t>
+            </a:r>
+            <a:r>
+              <a:rPr lang="en-US" dirty="0" err="1"/>
+              <a:t>incrementer</a:t>
+            </a:r>
+            <a:r>
+              <a:rPr lang="en-US" dirty="0"/>
+              <a:t> with a race condition to demonstrate the use of an </a:t>
+            </a:r>
+            <a:r>
+              <a:rPr lang="en-US" b="1" dirty="0"/>
+              <a:t>atomic counter</a:t>
+            </a:r>
+            <a:r>
+              <a:rPr lang="en-US" dirty="0"/>
+              <a:t>. </a:t>
+            </a:r>
+          </a:p>
+          <a:p>
+            <a:r>
+              <a:rPr lang="en-US" dirty="0"/>
+              <a:t> So what is </a:t>
+            </a:r>
+            <a:r>
+              <a:rPr lang="en-US" i="1" dirty="0"/>
+              <a:t>actually</a:t>
+            </a:r>
+            <a:r>
+              <a:rPr lang="en-US" dirty="0"/>
+              <a:t> happening behind the scenes is that there are very few </a:t>
+            </a:r>
+            <a:r>
+              <a:rPr lang="en-US" i="1" dirty="0"/>
+              <a:t>pure</a:t>
+            </a:r>
+            <a:r>
+              <a:rPr lang="en-US" dirty="0"/>
+              <a:t> atomic events in machine language. Even an increment has three portions:</a:t>
+            </a:r>
+          </a:p>
+          <a:p>
+            <a:pPr lvl="1"/>
+            <a:r>
+              <a:rPr lang="en-US" dirty="0"/>
+              <a:t> </a:t>
+            </a:r>
+            <a:r>
+              <a:rPr lang="en-US" b="1" dirty="0"/>
+              <a:t>FETCH</a:t>
+            </a:r>
+            <a:r>
+              <a:rPr lang="en-US" dirty="0"/>
+              <a:t> the variable</a:t>
+            </a:r>
+          </a:p>
+          <a:p>
+            <a:pPr lvl="1"/>
+            <a:r>
+              <a:rPr lang="en-US" dirty="0"/>
+              <a:t> </a:t>
+            </a:r>
+            <a:r>
+              <a:rPr lang="en-US" b="1" dirty="0"/>
+              <a:t>INCREMENT </a:t>
+            </a:r>
+            <a:r>
+              <a:rPr lang="en-US" dirty="0"/>
+              <a:t>the variable</a:t>
+            </a:r>
+          </a:p>
+          <a:p>
+            <a:pPr lvl="1"/>
+            <a:r>
+              <a:rPr lang="en-US" dirty="0"/>
+              <a:t> </a:t>
+            </a:r>
+            <a:r>
+              <a:rPr lang="en-US" b="1" dirty="0"/>
+              <a:t>STORE</a:t>
+            </a:r>
+            <a:r>
+              <a:rPr lang="en-US" dirty="0"/>
+              <a:t> the new variable</a:t>
+            </a:r>
+          </a:p>
+        </p:txBody>
+      </p:sp>
+      <p:pic>
+        <p:nvPicPr>
+          <p:cNvPr id="4098" name="Picture 2" descr="Image result for golang gopher">
+            <a:extLst>
+              <a:ext uri="{FF2B5EF4-FFF2-40B4-BE49-F238E27FC236}">
+                <a16:creationId xmlns:a16="http://schemas.microsoft.com/office/drawing/2014/main" id="{4D904754-6A64-9246-928F-2974DEC39250}"/>
+              </a:ext>
+            </a:extLst>
+          </p:cNvPr>
+          <p:cNvPicPr>
+            <a:picLocks noChangeAspect="1" noChangeArrowheads="1"/>
+          </p:cNvPicPr>
+          <p:nvPr/>
+        </p:nvPicPr>
+        <p:blipFill>
+          <a:blip r:embed="rId2">
+            <a:extLst>
+              <a:ext uri="{28A0092B-C50C-407E-A947-70E740481C1C}">
+                <a14:useLocalDpi xmlns:a14="http://schemas.microsoft.com/office/drawing/2010/main" val="0"/>
+              </a:ext>
+            </a:extLst>
+          </a:blip>
+          <a:srcRect/>
+          <a:stretch>
+            <a:fillRect/>
+          </a:stretch>
+        </p:blipFill>
+        <p:spPr bwMode="auto">
+          <a:xfrm>
+            <a:off x="5879379" y="4232634"/>
+            <a:ext cx="2053865" cy="2053865"/>
+          </a:xfrm>
+          <a:prstGeom prst="rect">
+            <a:avLst/>
+          </a:prstGeom>
+          <a:noFill/>
+          <a:extLst>
+            <a:ext uri="{909E8E84-426E-40DD-AFC4-6F175D3DCCD1}">
+              <a14:hiddenFill xmlns:a14="http://schemas.microsoft.com/office/drawing/2010/main">
+                <a:solidFill>
+                  <a:srgbClr val="FFFFFF"/>
+                </a:solidFill>
+              </a14:hiddenFill>
+            </a:ext>
+          </a:extLst>
+        </p:spPr>
+      </p:pic>
+    </p:spTree>
+    <p:extLst>
+      <p:ext uri="{BB962C8B-B14F-4D97-AF65-F5344CB8AC3E}">
+        <p14:creationId xmlns:p14="http://schemas.microsoft.com/office/powerpoint/2010/main" val="3810891331"/>
+      </p:ext>
+    </p:extLst>
+  </p:cSld>
+  <p:clrMapOvr>
+    <a:masterClrMapping/>
+  </p:clrMapOvr>
+</p:sld>
+</file>
+
+<file path=ppt/slides/slide4.xml><?xml version="1.0" encoding="utf-8"?>
+<p:sld xmlns:a="http://schemas.openxmlformats.org/drawingml/2006/main" xmlns:r="http://schemas.openxmlformats.org/officeDocument/2006/relationships" xmlns:p="http://schemas.openxmlformats.org/presentationml/2006/main">
+  <p:cSld>
+    <p:spTree>
+      <p:nvGrpSpPr>
+        <p:cNvPr id="1" name=""/>
+        <p:cNvGrpSpPr/>
+        <p:nvPr/>
+      </p:nvGrpSpPr>
+      <p:grpSpPr>
+        <a:xfrm>
+          <a:off x="0" y="0"/>
+          <a:ext cx="0" cy="0"/>
+          <a:chOff x="0" y="0"/>
+          <a:chExt cx="0" cy="0"/>
+        </a:xfrm>
+      </p:grpSpPr>
+      <p:sp>
+        <p:nvSpPr>
+          <p:cNvPr id="2" name="Title 1">
+            <a:extLst>
+              <a:ext uri="{FF2B5EF4-FFF2-40B4-BE49-F238E27FC236}">
+                <a16:creationId xmlns:a16="http://schemas.microsoft.com/office/drawing/2014/main" id="{70439440-D462-214D-BE5F-540E84D0818D}"/>
+              </a:ext>
+            </a:extLst>
+          </p:cNvPr>
+          <p:cNvSpPr>
+            <a:spLocks noGrp="1"/>
+          </p:cNvSpPr>
+          <p:nvPr>
+            <p:ph type="title"/>
+          </p:nvPr>
+        </p:nvSpPr>
+        <p:spPr/>
+        <p:txBody>
+          <a:bodyPr/>
+          <a:lstStyle/>
+          <a:p>
+            <a:r>
+              <a:rPr lang="en-US" dirty="0"/>
+              <a:t>Parallelism in GO</a:t>
+            </a:r>
+          </a:p>
+        </p:txBody>
+      </p:sp>
+      <p:sp>
+        <p:nvSpPr>
+          <p:cNvPr id="3" name="Text Placeholder 2">
+            <a:extLst>
+              <a:ext uri="{FF2B5EF4-FFF2-40B4-BE49-F238E27FC236}">
+                <a16:creationId xmlns:a16="http://schemas.microsoft.com/office/drawing/2014/main" id="{2637EF67-9346-FC42-805A-E5A953E2F20F}"/>
+              </a:ext>
+            </a:extLst>
+          </p:cNvPr>
+          <p:cNvSpPr>
+            <a:spLocks noGrp="1"/>
+          </p:cNvSpPr>
+          <p:nvPr>
+            <p:ph type="body" idx="1"/>
+          </p:nvPr>
+        </p:nvSpPr>
+        <p:spPr/>
+        <p:txBody>
+          <a:bodyPr/>
+          <a:lstStyle/>
+          <a:p>
+            <a:r>
+              <a:rPr lang="en-US" dirty="0"/>
+              <a:t> Basically two things happening at once. You can do this in multi-core systems by having things operate on different cores. So in the jogging example:</a:t>
+            </a:r>
+          </a:p>
+          <a:p>
+            <a:pPr lvl="1"/>
+            <a:r>
+              <a:rPr lang="en-US" i="1" dirty="0"/>
+              <a:t> As you are jogging you are simultaneously listening to your </a:t>
+            </a:r>
+            <a:r>
+              <a:rPr lang="en-US" i="1" dirty="0" err="1"/>
+              <a:t>ipod</a:t>
+            </a:r>
+            <a:r>
+              <a:rPr lang="en-US" i="1" dirty="0"/>
+              <a:t>. You are now operating your jogging and </a:t>
+            </a:r>
+            <a:r>
+              <a:rPr lang="en-US" i="1" dirty="0" err="1"/>
+              <a:t>ipod</a:t>
+            </a:r>
+            <a:r>
+              <a:rPr lang="en-US" i="1" dirty="0"/>
+              <a:t> </a:t>
+            </a:r>
+            <a:r>
+              <a:rPr lang="en-US" b="1" i="1" dirty="0"/>
+              <a:t>in parallel</a:t>
+            </a:r>
+            <a:r>
+              <a:rPr lang="en-US" i="1" dirty="0"/>
+              <a:t>.</a:t>
+            </a:r>
+          </a:p>
+        </p:txBody>
+      </p:sp>
+      <p:pic>
+        <p:nvPicPr>
+          <p:cNvPr id="2050" name="Picture 2" descr="concurrency-parallelism-go">
+            <a:extLst>
+              <a:ext uri="{FF2B5EF4-FFF2-40B4-BE49-F238E27FC236}">
+                <a16:creationId xmlns:a16="http://schemas.microsoft.com/office/drawing/2014/main" id="{F2A47BE4-6B23-4946-B794-F1853063C757}"/>
+              </a:ext>
+            </a:extLst>
+          </p:cNvPr>
+          <p:cNvPicPr>
+            <a:picLocks noChangeAspect="1" noChangeArrowheads="1"/>
+          </p:cNvPicPr>
+          <p:nvPr/>
+        </p:nvPicPr>
+        <p:blipFill rotWithShape="1">
+          <a:blip r:embed="rId2">
+            <a:extLst>
+              <a:ext uri="{28A0092B-C50C-407E-A947-70E740481C1C}">
+                <a14:useLocalDpi xmlns:a14="http://schemas.microsoft.com/office/drawing/2010/main" val="0"/>
+              </a:ext>
+            </a:extLst>
+          </a:blip>
+          <a:srcRect t="37372"/>
+          <a:stretch/>
+        </p:blipFill>
+        <p:spPr bwMode="auto">
+          <a:xfrm>
+            <a:off x="1055801" y="3820210"/>
+            <a:ext cx="6787299" cy="2659729"/>
+          </a:xfrm>
+          <a:prstGeom prst="rect">
+            <a:avLst/>
+          </a:prstGeom>
+          <a:noFill/>
+          <a:extLst>
+            <a:ext uri="{909E8E84-426E-40DD-AFC4-6F175D3DCCD1}">
+              <a14:hiddenFill xmlns:a14="http://schemas.microsoft.com/office/drawing/2010/main">
+                <a:solidFill>
+                  <a:srgbClr val="FFFFFF"/>
+                </a:solidFill>
+              </a14:hiddenFill>
+            </a:ext>
+          </a:extLst>
+        </p:spPr>
+      </p:pic>
+    </p:spTree>
+    <p:extLst>
+      <p:ext uri="{BB962C8B-B14F-4D97-AF65-F5344CB8AC3E}">
+        <p14:creationId xmlns:p14="http://schemas.microsoft.com/office/powerpoint/2010/main" val="2975953495"/>
+      </p:ext>
+    </p:extLst>
+  </p:cSld>
+  <p:clrMapOvr>
+    <a:masterClrMapping/>
+  </p:clrMapOvr>
+</p:sld>
+</file>
+
+<file path=ppt/slides/slide40.xml><?xml version="1.0" encoding="utf-8"?>
+<p:sld xmlns:a="http://schemas.openxmlformats.org/drawingml/2006/main" xmlns:r="http://schemas.openxmlformats.org/officeDocument/2006/relationships" xmlns:p="http://schemas.openxmlformats.org/presentationml/2006/main">
+  <p:cSld>
+    <p:spTree>
+      <p:nvGrpSpPr>
+        <p:cNvPr id="1" name=""/>
+        <p:cNvGrpSpPr/>
+        <p:nvPr/>
+      </p:nvGrpSpPr>
+      <p:grpSpPr>
+        <a:xfrm>
+          <a:off x="0" y="0"/>
+          <a:ext cx="0" cy="0"/>
+          <a:chOff x="0" y="0"/>
+          <a:chExt cx="0" cy="0"/>
+        </a:xfrm>
+      </p:grpSpPr>
+      <p:sp>
+        <p:nvSpPr>
+          <p:cNvPr id="2" name="Title 1">
+            <a:extLst>
+              <a:ext uri="{FF2B5EF4-FFF2-40B4-BE49-F238E27FC236}">
+                <a16:creationId xmlns:a16="http://schemas.microsoft.com/office/drawing/2014/main" id="{9266AFCE-38E1-A240-B2D6-D42D32014F79}"/>
+              </a:ext>
+            </a:extLst>
+          </p:cNvPr>
+          <p:cNvSpPr>
+            <a:spLocks noGrp="1"/>
+          </p:cNvSpPr>
+          <p:nvPr>
+            <p:ph type="title"/>
+          </p:nvPr>
+        </p:nvSpPr>
+        <p:spPr/>
+        <p:txBody>
+          <a:bodyPr/>
+          <a:lstStyle/>
+          <a:p>
+            <a:r>
+              <a:rPr lang="en-US" dirty="0"/>
+              <a:t>Atomic processes</a:t>
+            </a:r>
+          </a:p>
+        </p:txBody>
+      </p:sp>
+      <p:sp>
+        <p:nvSpPr>
+          <p:cNvPr id="3" name="Text Placeholder 2">
+            <a:extLst>
+              <a:ext uri="{FF2B5EF4-FFF2-40B4-BE49-F238E27FC236}">
+                <a16:creationId xmlns:a16="http://schemas.microsoft.com/office/drawing/2014/main" id="{D7DEB548-37A0-C841-AF3C-A2D7337D3303}"/>
+              </a:ext>
+            </a:extLst>
+          </p:cNvPr>
+          <p:cNvSpPr>
+            <a:spLocks noGrp="1"/>
+          </p:cNvSpPr>
+          <p:nvPr>
+            <p:ph type="body" idx="1"/>
+          </p:nvPr>
+        </p:nvSpPr>
+        <p:spPr/>
+        <p:txBody>
+          <a:bodyPr/>
+          <a:lstStyle/>
+          <a:p>
+            <a:r>
+              <a:rPr lang="en-US" dirty="0"/>
+              <a:t> So basically what the </a:t>
+            </a:r>
+            <a:r>
+              <a:rPr lang="en-US" b="1" dirty="0"/>
+              <a:t>atomic</a:t>
+            </a:r>
+            <a:r>
+              <a:rPr lang="en-US" dirty="0"/>
+              <a:t> package is doing is similar to what the </a:t>
+            </a:r>
+            <a:r>
+              <a:rPr lang="en-US" b="1" dirty="0"/>
+              <a:t>mutex</a:t>
+            </a:r>
+            <a:r>
+              <a:rPr lang="en-US" dirty="0"/>
+              <a:t> package was doing- which is to take a three step method and make it an </a:t>
+            </a:r>
+            <a:r>
+              <a:rPr lang="en-US" b="1" dirty="0"/>
+              <a:t>atomic</a:t>
+            </a:r>
+            <a:r>
+              <a:rPr lang="en-US" dirty="0"/>
+              <a:t> one by locking the variable.</a:t>
+            </a:r>
+          </a:p>
+        </p:txBody>
+      </p:sp>
+      <p:pic>
+        <p:nvPicPr>
+          <p:cNvPr id="5122" name="Picture 2" descr="Image result for golang gopher">
+            <a:extLst>
+              <a:ext uri="{FF2B5EF4-FFF2-40B4-BE49-F238E27FC236}">
+                <a16:creationId xmlns:a16="http://schemas.microsoft.com/office/drawing/2014/main" id="{F002B9B2-0484-3D4E-A0FB-7C61DEE4D8BB}"/>
+              </a:ext>
+            </a:extLst>
+          </p:cNvPr>
+          <p:cNvPicPr>
+            <a:picLocks noChangeAspect="1" noChangeArrowheads="1"/>
+          </p:cNvPicPr>
+          <p:nvPr/>
+        </p:nvPicPr>
+        <p:blipFill>
+          <a:blip r:embed="rId2">
+            <a:extLst>
+              <a:ext uri="{28A0092B-C50C-407E-A947-70E740481C1C}">
+                <a14:useLocalDpi xmlns:a14="http://schemas.microsoft.com/office/drawing/2010/main" val="0"/>
+              </a:ext>
+            </a:extLst>
+          </a:blip>
+          <a:srcRect/>
+          <a:stretch>
+            <a:fillRect/>
+          </a:stretch>
+        </p:blipFill>
+        <p:spPr bwMode="auto">
+          <a:xfrm>
+            <a:off x="3256371" y="3328024"/>
+            <a:ext cx="2857500" cy="2857500"/>
+          </a:xfrm>
+          <a:prstGeom prst="rect">
+            <a:avLst/>
+          </a:prstGeom>
+          <a:noFill/>
+          <a:extLst>
+            <a:ext uri="{909E8E84-426E-40DD-AFC4-6F175D3DCCD1}">
+              <a14:hiddenFill xmlns:a14="http://schemas.microsoft.com/office/drawing/2010/main">
+                <a:solidFill>
+                  <a:srgbClr val="FFFFFF"/>
+                </a:solidFill>
+              </a14:hiddenFill>
+            </a:ext>
+          </a:extLst>
+        </p:spPr>
+      </p:pic>
+    </p:spTree>
+    <p:extLst>
+      <p:ext uri="{BB962C8B-B14F-4D97-AF65-F5344CB8AC3E}">
+        <p14:creationId xmlns:p14="http://schemas.microsoft.com/office/powerpoint/2010/main" val="3714987180"/>
+      </p:ext>
+    </p:extLst>
+  </p:cSld>
+  <p:clrMapOvr>
+    <a:masterClrMapping/>
+  </p:clrMapOvr>
+</p:sld>
+</file>
+
+<file path=ppt/slides/slide41.xml><?xml version="1.0" encoding="utf-8"?>
 <p:sld xmlns:a="http://schemas.openxmlformats.org/drawingml/2006/main" xmlns:r="http://schemas.openxmlformats.org/officeDocument/2006/relationships" xmlns:p="http://schemas.openxmlformats.org/presentationml/2006/main">
   <p:cSld>
     <p:spTree>
@@ -11950,11 +12869,7 @@
             </a:pPr>
             <a:r>
               <a:rPr lang="en-US" dirty="0"/>
-              <a:t>Moving on </a:t>
-            </a:r>
-            <a:r>
-              <a:rPr lang="en-US"/>
-              <a:t>to Module 4….</a:t>
+              <a:t>Moving on to Module 5….</a:t>
             </a:r>
             <a:endParaRPr dirty="0"/>
           </a:p>
@@ -12196,168 +13111,6 @@
     <p:extLst>
       <p:ext uri="{BB962C8B-B14F-4D97-AF65-F5344CB8AC3E}">
         <p14:creationId xmlns:p14="http://schemas.microsoft.com/office/powerpoint/2010/main" val="3120604218"/>
-      </p:ext>
-    </p:extLst>
-  </p:cSld>
-  <p:clrMapOvr>
-    <a:masterClrMapping/>
-  </p:clrMapOvr>
-</p:sld>
-</file>
-
-<file path=ppt/slides/slide4.xml><?xml version="1.0" encoding="utf-8"?>
-<p:sld xmlns:a="http://schemas.openxmlformats.org/drawingml/2006/main" xmlns:r="http://schemas.openxmlformats.org/officeDocument/2006/relationships" xmlns:p="http://schemas.openxmlformats.org/presentationml/2006/main">
-  <p:cSld>
-    <p:spTree>
-      <p:nvGrpSpPr>
-        <p:cNvPr id="1" name=""/>
-        <p:cNvGrpSpPr/>
-        <p:nvPr/>
-      </p:nvGrpSpPr>
-      <p:grpSpPr>
-        <a:xfrm>
-          <a:off x="0" y="0"/>
-          <a:ext cx="0" cy="0"/>
-          <a:chOff x="0" y="0"/>
-          <a:chExt cx="0" cy="0"/>
-        </a:xfrm>
-      </p:grpSpPr>
-      <p:sp>
-        <p:nvSpPr>
-          <p:cNvPr id="2" name="Title 1">
-            <a:extLst>
-              <a:ext uri="{FF2B5EF4-FFF2-40B4-BE49-F238E27FC236}">
-                <a16:creationId xmlns:a16="http://schemas.microsoft.com/office/drawing/2014/main" id="{70439440-D462-214D-BE5F-540E84D0818D}"/>
-              </a:ext>
-            </a:extLst>
-          </p:cNvPr>
-          <p:cNvSpPr>
-            <a:spLocks noGrp="1"/>
-          </p:cNvSpPr>
-          <p:nvPr>
-            <p:ph type="title"/>
-          </p:nvPr>
-        </p:nvSpPr>
-        <p:spPr/>
-        <p:txBody>
-          <a:bodyPr/>
-          <a:lstStyle/>
-          <a:p>
-            <a:r>
-              <a:rPr lang="en-US" dirty="0"/>
-              <a:t>Parallelism in GO</a:t>
-            </a:r>
-          </a:p>
-        </p:txBody>
-      </p:sp>
-      <p:sp>
-        <p:nvSpPr>
-          <p:cNvPr id="3" name="Text Placeholder 2">
-            <a:extLst>
-              <a:ext uri="{FF2B5EF4-FFF2-40B4-BE49-F238E27FC236}">
-                <a16:creationId xmlns:a16="http://schemas.microsoft.com/office/drawing/2014/main" id="{2637EF67-9346-FC42-805A-E5A953E2F20F}"/>
-              </a:ext>
-            </a:extLst>
-          </p:cNvPr>
-          <p:cNvSpPr>
-            <a:spLocks noGrp="1"/>
-          </p:cNvSpPr>
-          <p:nvPr>
-            <p:ph type="body" idx="1"/>
-          </p:nvPr>
-        </p:nvSpPr>
-        <p:spPr/>
-        <p:txBody>
-          <a:bodyPr/>
-          <a:lstStyle/>
-          <a:p>
-            <a:r>
-              <a:rPr lang="en-US" dirty="0"/>
-              <a:t> Basically two things happening at once. You can do this in multi-core systems by having things operate on different cores. So in the jogging example:</a:t>
-            </a:r>
-          </a:p>
-          <a:p>
-            <a:pPr lvl="1"/>
-            <a:r>
-              <a:rPr lang="en-US" i="1" dirty="0"/>
-              <a:t> As you are jogging you are simultaneously listening to your </a:t>
-            </a:r>
-            <a:r>
-              <a:rPr lang="en-US" i="1" dirty="0" err="1"/>
-              <a:t>ipod</a:t>
-            </a:r>
-            <a:r>
-              <a:rPr lang="en-US" i="1" dirty="0"/>
-              <a:t>. You are now operating your jogging and </a:t>
-            </a:r>
-            <a:r>
-              <a:rPr lang="en-US" i="1" dirty="0" err="1"/>
-              <a:t>ipod</a:t>
-            </a:r>
-            <a:r>
-              <a:rPr lang="en-US" i="1" dirty="0"/>
-              <a:t> </a:t>
-            </a:r>
-            <a:r>
-              <a:rPr lang="en-US" b="1" i="1" dirty="0"/>
-              <a:t>in parallel</a:t>
-            </a:r>
-            <a:r>
-              <a:rPr lang="en-US" i="1" dirty="0"/>
-              <a:t>.</a:t>
-            </a:r>
-          </a:p>
-        </p:txBody>
-      </p:sp>
-      <p:pic>
-        <p:nvPicPr>
-          <p:cNvPr id="2050" name="Picture 2" descr="concurrency-parallelism-go">
-            <a:extLst>
-              <a:ext uri="{FF2B5EF4-FFF2-40B4-BE49-F238E27FC236}">
-                <a16:creationId xmlns:a16="http://schemas.microsoft.com/office/drawing/2014/main" id="{F2A47BE4-6B23-4946-B794-F1853063C757}"/>
-              </a:ext>
-            </a:extLst>
-          </p:cNvPr>
-          <p:cNvPicPr>
-            <a:picLocks noChangeAspect="1" noChangeArrowheads="1"/>
-          </p:cNvPicPr>
-          <p:nvPr/>
-        </p:nvPicPr>
-        <p:blipFill rotWithShape="1">
-          <a:blip r:embed="rId2">
-            <a:extLst>
-              <a:ext uri="{28A0092B-C50C-407E-A947-70E740481C1C}">
-                <a14:useLocalDpi xmlns:a14="http://schemas.microsoft.com/office/drawing/2010/main" val="0"/>
-              </a:ext>
-            </a:extLst>
-          </a:blip>
-          <a:srcRect t="37372"/>
-          <a:stretch/>
-        </p:blipFill>
-        <p:spPr bwMode="auto">
-          <a:xfrm>
-            <a:off x="1055801" y="3820210"/>
-            <a:ext cx="6787299" cy="2659729"/>
-          </a:xfrm>
-          <a:prstGeom prst="rect">
-            <a:avLst/>
-          </a:prstGeom>
-          <a:noFill/>
-          <a:extLst>
-            <a:ext uri="{909E8E84-426E-40DD-AFC4-6F175D3DCCD1}">
-              <a14:hiddenFill xmlns:a14="http://schemas.microsoft.com/office/drawing/2010/main">
-                <a:solidFill>
-                  <a:srgbClr val="FFFFFF"/>
-                </a:solidFill>
-              </a14:hiddenFill>
-            </a:ext>
-          </a:extLst>
-        </p:spPr>
-      </p:pic>
-    </p:spTree>
-    <p:extLst>
-      <p:ext uri="{BB962C8B-B14F-4D97-AF65-F5344CB8AC3E}">
-        <p14:creationId xmlns:p14="http://schemas.microsoft.com/office/powerpoint/2010/main" val="2975953495"/>
       </p:ext>
     </p:extLst>
   </p:cSld>

</xml_diff>